<commit_message>
-Aggiornamento presentazione (abbozzo slides)
</commit_message>
<xml_diff>
--- a/Presentazione.pptx
+++ b/Presentazione.pptx
@@ -6,6 +6,11 @@
   </p:sldMasterIdLst>
   <p:sldIdLst>
     <p:sldId id="256" r:id="rId2"/>
+    <p:sldId id="257" r:id="rId3"/>
+    <p:sldId id="258" r:id="rId4"/>
+    <p:sldId id="259" r:id="rId5"/>
+    <p:sldId id="260" r:id="rId6"/>
+    <p:sldId id="261" r:id="rId7"/>
   </p:sldIdLst>
   <p:sldSz cx="9144000" cy="6858000" type="screen4x3"/>
   <p:notesSz cx="6858000" cy="9144000"/>
@@ -288,7 +293,7 @@
           <a:p>
             <a:fld id="{2DC34C15-3179-664E-94AC-82A30805A8C9}" type="datetimeFigureOut">
               <a:rPr lang="it-IT" smtClean="0"/>
-              <a:t>03/01/15</a:t>
+              <a:t>05/01/15</a:t>
             </a:fld>
             <a:endParaRPr lang="it-IT"/>
           </a:p>
@@ -458,7 +463,7 @@
           <a:p>
             <a:fld id="{2DC34C15-3179-664E-94AC-82A30805A8C9}" type="datetimeFigureOut">
               <a:rPr lang="it-IT" smtClean="0"/>
-              <a:t>03/01/15</a:t>
+              <a:t>05/01/15</a:t>
             </a:fld>
             <a:endParaRPr lang="it-IT"/>
           </a:p>
@@ -638,7 +643,7 @@
           <a:p>
             <a:fld id="{2DC34C15-3179-664E-94AC-82A30805A8C9}" type="datetimeFigureOut">
               <a:rPr lang="it-IT" smtClean="0"/>
-              <a:t>03/01/15</a:t>
+              <a:t>05/01/15</a:t>
             </a:fld>
             <a:endParaRPr lang="it-IT"/>
           </a:p>
@@ -808,7 +813,7 @@
           <a:p>
             <a:fld id="{2DC34C15-3179-664E-94AC-82A30805A8C9}" type="datetimeFigureOut">
               <a:rPr lang="it-IT" smtClean="0"/>
-              <a:t>03/01/15</a:t>
+              <a:t>05/01/15</a:t>
             </a:fld>
             <a:endParaRPr lang="it-IT"/>
           </a:p>
@@ -1054,7 +1059,7 @@
           <a:p>
             <a:fld id="{2DC34C15-3179-664E-94AC-82A30805A8C9}" type="datetimeFigureOut">
               <a:rPr lang="it-IT" smtClean="0"/>
-              <a:t>03/01/15</a:t>
+              <a:t>05/01/15</a:t>
             </a:fld>
             <a:endParaRPr lang="it-IT"/>
           </a:p>
@@ -1342,7 +1347,7 @@
           <a:p>
             <a:fld id="{2DC34C15-3179-664E-94AC-82A30805A8C9}" type="datetimeFigureOut">
               <a:rPr lang="it-IT" smtClean="0"/>
-              <a:t>03/01/15</a:t>
+              <a:t>05/01/15</a:t>
             </a:fld>
             <a:endParaRPr lang="it-IT"/>
           </a:p>
@@ -1764,7 +1769,7 @@
           <a:p>
             <a:fld id="{2DC34C15-3179-664E-94AC-82A30805A8C9}" type="datetimeFigureOut">
               <a:rPr lang="it-IT" smtClean="0"/>
-              <a:t>03/01/15</a:t>
+              <a:t>05/01/15</a:t>
             </a:fld>
             <a:endParaRPr lang="it-IT"/>
           </a:p>
@@ -1882,7 +1887,7 @@
           <a:p>
             <a:fld id="{2DC34C15-3179-664E-94AC-82A30805A8C9}" type="datetimeFigureOut">
               <a:rPr lang="it-IT" smtClean="0"/>
-              <a:t>03/01/15</a:t>
+              <a:t>05/01/15</a:t>
             </a:fld>
             <a:endParaRPr lang="it-IT"/>
           </a:p>
@@ -1977,7 +1982,7 @@
           <a:p>
             <a:fld id="{2DC34C15-3179-664E-94AC-82A30805A8C9}" type="datetimeFigureOut">
               <a:rPr lang="it-IT" smtClean="0"/>
-              <a:t>03/01/15</a:t>
+              <a:t>05/01/15</a:t>
             </a:fld>
             <a:endParaRPr lang="it-IT"/>
           </a:p>
@@ -2254,7 +2259,7 @@
           <a:p>
             <a:fld id="{2DC34C15-3179-664E-94AC-82A30805A8C9}" type="datetimeFigureOut">
               <a:rPr lang="it-IT" smtClean="0"/>
-              <a:t>03/01/15</a:t>
+              <a:t>05/01/15</a:t>
             </a:fld>
             <a:endParaRPr lang="it-IT"/>
           </a:p>
@@ -2507,7 +2512,7 @@
           <a:p>
             <a:fld id="{2DC34C15-3179-664E-94AC-82A30805A8C9}" type="datetimeFigureOut">
               <a:rPr lang="it-IT" smtClean="0"/>
-              <a:t>03/01/15</a:t>
+              <a:t>05/01/15</a:t>
             </a:fld>
             <a:endParaRPr lang="it-IT"/>
           </a:p>
@@ -2720,7 +2725,7 @@
           <a:p>
             <a:fld id="{2DC34C15-3179-664E-94AC-82A30805A8C9}" type="datetimeFigureOut">
               <a:rPr lang="it-IT" smtClean="0"/>
-              <a:t>03/01/15</a:t>
+              <a:t>05/01/15</a:t>
             </a:fld>
             <a:endParaRPr lang="it-IT"/>
           </a:p>
@@ -3165,6 +3170,370 @@
     <p:extLst>
       <p:ext uri="{BB962C8B-B14F-4D97-AF65-F5344CB8AC3E}">
         <p14:creationId xmlns:p14="http://schemas.microsoft.com/office/powerpoint/2010/main" val="3244016071"/>
+      </p:ext>
+    </p:extLst>
+  </p:cSld>
+  <p:clrMapOvr>
+    <a:masterClrMapping/>
+  </p:clrMapOvr>
+</p:sld>
+</file>
+
+<file path=ppt/slides/slide2.xml><?xml version="1.0" encoding="utf-8"?>
+<p:sld xmlns:a="http://schemas.openxmlformats.org/drawingml/2006/main" xmlns:r="http://schemas.openxmlformats.org/officeDocument/2006/relationships" xmlns:p="http://schemas.openxmlformats.org/presentationml/2006/main">
+  <p:cSld>
+    <p:spTree>
+      <p:nvGrpSpPr>
+        <p:cNvPr id="1" name=""/>
+        <p:cNvGrpSpPr/>
+        <p:nvPr/>
+      </p:nvGrpSpPr>
+      <p:grpSpPr>
+        <a:xfrm>
+          <a:off x="0" y="0"/>
+          <a:ext cx="0" cy="0"/>
+          <a:chOff x="0" y="0"/>
+          <a:chExt cx="0" cy="0"/>
+        </a:xfrm>
+      </p:grpSpPr>
+      <p:sp>
+        <p:nvSpPr>
+          <p:cNvPr id="2" name="Titolo 1"/>
+          <p:cNvSpPr>
+            <a:spLocks noGrp="1"/>
+          </p:cNvSpPr>
+          <p:nvPr>
+            <p:ph type="title"/>
+          </p:nvPr>
+        </p:nvSpPr>
+        <p:spPr/>
+        <p:txBody>
+          <a:bodyPr/>
+          <a:lstStyle/>
+          <a:p>
+            <a:r>
+              <a:rPr lang="it-IT" dirty="0" smtClean="0"/>
+              <a:t>Ragionamento inserimento tabella</a:t>
+            </a:r>
+            <a:endParaRPr lang="it-IT" dirty="0"/>
+          </a:p>
+        </p:txBody>
+      </p:sp>
+      <p:sp>
+        <p:nvSpPr>
+          <p:cNvPr id="3" name="Segnaposto contenuto 2"/>
+          <p:cNvSpPr>
+            <a:spLocks noGrp="1"/>
+          </p:cNvSpPr>
+          <p:nvPr>
+            <p:ph idx="1"/>
+          </p:nvPr>
+        </p:nvSpPr>
+        <p:spPr/>
+        <p:txBody>
+          <a:bodyPr/>
+          <a:lstStyle/>
+          <a:p>
+            <a:endParaRPr lang="it-IT"/>
+          </a:p>
+        </p:txBody>
+      </p:sp>
+    </p:spTree>
+    <p:extLst>
+      <p:ext uri="{BB962C8B-B14F-4D97-AF65-F5344CB8AC3E}">
+        <p14:creationId xmlns:p14="http://schemas.microsoft.com/office/powerpoint/2010/main" val="3613284139"/>
+      </p:ext>
+    </p:extLst>
+  </p:cSld>
+  <p:clrMapOvr>
+    <a:masterClrMapping/>
+  </p:clrMapOvr>
+</p:sld>
+</file>
+
+<file path=ppt/slides/slide3.xml><?xml version="1.0" encoding="utf-8"?>
+<p:sld xmlns:a="http://schemas.openxmlformats.org/drawingml/2006/main" xmlns:r="http://schemas.openxmlformats.org/officeDocument/2006/relationships" xmlns:p="http://schemas.openxmlformats.org/presentationml/2006/main">
+  <p:cSld>
+    <p:spTree>
+      <p:nvGrpSpPr>
+        <p:cNvPr id="1" name=""/>
+        <p:cNvGrpSpPr/>
+        <p:nvPr/>
+      </p:nvGrpSpPr>
+      <p:grpSpPr>
+        <a:xfrm>
+          <a:off x="0" y="0"/>
+          <a:ext cx="0" cy="0"/>
+          <a:chOff x="0" y="0"/>
+          <a:chExt cx="0" cy="0"/>
+        </a:xfrm>
+      </p:grpSpPr>
+      <p:sp>
+        <p:nvSpPr>
+          <p:cNvPr id="2" name="Titolo 1"/>
+          <p:cNvSpPr>
+            <a:spLocks noGrp="1"/>
+          </p:cNvSpPr>
+          <p:nvPr>
+            <p:ph type="title"/>
+          </p:nvPr>
+        </p:nvSpPr>
+        <p:spPr/>
+        <p:txBody>
+          <a:bodyPr/>
+          <a:lstStyle/>
+          <a:p>
+            <a:r>
+              <a:rPr lang="it-IT" dirty="0" smtClean="0"/>
+              <a:t>Ragionamento mescolamento</a:t>
+            </a:r>
+            <a:endParaRPr lang="it-IT" dirty="0"/>
+          </a:p>
+        </p:txBody>
+      </p:sp>
+      <p:sp>
+        <p:nvSpPr>
+          <p:cNvPr id="3" name="Segnaposto contenuto 2"/>
+          <p:cNvSpPr>
+            <a:spLocks noGrp="1"/>
+          </p:cNvSpPr>
+          <p:nvPr>
+            <p:ph idx="1"/>
+          </p:nvPr>
+        </p:nvSpPr>
+        <p:spPr/>
+        <p:txBody>
+          <a:bodyPr/>
+          <a:lstStyle/>
+          <a:p>
+            <a:endParaRPr lang="it-IT"/>
+          </a:p>
+        </p:txBody>
+      </p:sp>
+    </p:spTree>
+    <p:extLst>
+      <p:ext uri="{BB962C8B-B14F-4D97-AF65-F5344CB8AC3E}">
+        <p14:creationId xmlns:p14="http://schemas.microsoft.com/office/powerpoint/2010/main" val="3018076514"/>
+      </p:ext>
+    </p:extLst>
+  </p:cSld>
+  <p:clrMapOvr>
+    <a:masterClrMapping/>
+  </p:clrMapOvr>
+</p:sld>
+</file>
+
+<file path=ppt/slides/slide4.xml><?xml version="1.0" encoding="utf-8"?>
+<p:sld xmlns:a="http://schemas.openxmlformats.org/drawingml/2006/main" xmlns:r="http://schemas.openxmlformats.org/officeDocument/2006/relationships" xmlns:p="http://schemas.openxmlformats.org/presentationml/2006/main">
+  <p:cSld>
+    <p:spTree>
+      <p:nvGrpSpPr>
+        <p:cNvPr id="1" name=""/>
+        <p:cNvGrpSpPr/>
+        <p:nvPr/>
+      </p:nvGrpSpPr>
+      <p:grpSpPr>
+        <a:xfrm>
+          <a:off x="0" y="0"/>
+          <a:ext cx="0" cy="0"/>
+          <a:chOff x="0" y="0"/>
+          <a:chExt cx="0" cy="0"/>
+        </a:xfrm>
+      </p:grpSpPr>
+      <p:sp>
+        <p:nvSpPr>
+          <p:cNvPr id="2" name="Titolo 1"/>
+          <p:cNvSpPr>
+            <a:spLocks noGrp="1"/>
+          </p:cNvSpPr>
+          <p:nvPr>
+            <p:ph type="title"/>
+          </p:nvPr>
+        </p:nvSpPr>
+        <p:spPr/>
+        <p:txBody>
+          <a:bodyPr/>
+          <a:lstStyle/>
+          <a:p>
+            <a:r>
+              <a:rPr lang="it-IT" dirty="0" smtClean="0"/>
+              <a:t>Ragionamento click su cella</a:t>
+            </a:r>
+            <a:endParaRPr lang="it-IT" dirty="0"/>
+          </a:p>
+        </p:txBody>
+      </p:sp>
+      <p:sp>
+        <p:nvSpPr>
+          <p:cNvPr id="3" name="Segnaposto contenuto 2"/>
+          <p:cNvSpPr>
+            <a:spLocks noGrp="1"/>
+          </p:cNvSpPr>
+          <p:nvPr>
+            <p:ph idx="1"/>
+          </p:nvPr>
+        </p:nvSpPr>
+        <p:spPr/>
+        <p:txBody>
+          <a:bodyPr/>
+          <a:lstStyle/>
+          <a:p>
+            <a:endParaRPr lang="it-IT"/>
+          </a:p>
+        </p:txBody>
+      </p:sp>
+    </p:spTree>
+    <p:extLst>
+      <p:ext uri="{BB962C8B-B14F-4D97-AF65-F5344CB8AC3E}">
+        <p14:creationId xmlns:p14="http://schemas.microsoft.com/office/powerpoint/2010/main" val="506087268"/>
+      </p:ext>
+    </p:extLst>
+  </p:cSld>
+  <p:clrMapOvr>
+    <a:masterClrMapping/>
+  </p:clrMapOvr>
+</p:sld>
+</file>
+
+<file path=ppt/slides/slide5.xml><?xml version="1.0" encoding="utf-8"?>
+<p:sld xmlns:a="http://schemas.openxmlformats.org/drawingml/2006/main" xmlns:r="http://schemas.openxmlformats.org/officeDocument/2006/relationships" xmlns:p="http://schemas.openxmlformats.org/presentationml/2006/main">
+  <p:cSld>
+    <p:spTree>
+      <p:nvGrpSpPr>
+        <p:cNvPr id="1" name=""/>
+        <p:cNvGrpSpPr/>
+        <p:nvPr/>
+      </p:nvGrpSpPr>
+      <p:grpSpPr>
+        <a:xfrm>
+          <a:off x="0" y="0"/>
+          <a:ext cx="0" cy="0"/>
+          <a:chOff x="0" y="0"/>
+          <a:chExt cx="0" cy="0"/>
+        </a:xfrm>
+      </p:grpSpPr>
+      <p:sp>
+        <p:nvSpPr>
+          <p:cNvPr id="2" name="Titolo 1"/>
+          <p:cNvSpPr>
+            <a:spLocks noGrp="1"/>
+          </p:cNvSpPr>
+          <p:nvPr>
+            <p:ph type="title"/>
+          </p:nvPr>
+        </p:nvSpPr>
+        <p:spPr/>
+        <p:txBody>
+          <a:bodyPr/>
+          <a:lstStyle/>
+          <a:p>
+            <a:r>
+              <a:rPr lang="it-IT" dirty="0" smtClean="0"/>
+              <a:t>Cenni stile e </a:t>
+            </a:r>
+            <a:r>
+              <a:rPr lang="it-IT" dirty="0" err="1" smtClean="0"/>
+              <a:t>index</a:t>
+            </a:r>
+            <a:endParaRPr lang="it-IT" dirty="0"/>
+          </a:p>
+        </p:txBody>
+      </p:sp>
+      <p:sp>
+        <p:nvSpPr>
+          <p:cNvPr id="3" name="Segnaposto contenuto 2"/>
+          <p:cNvSpPr>
+            <a:spLocks noGrp="1"/>
+          </p:cNvSpPr>
+          <p:nvPr>
+            <p:ph idx="1"/>
+          </p:nvPr>
+        </p:nvSpPr>
+        <p:spPr/>
+        <p:txBody>
+          <a:bodyPr/>
+          <a:lstStyle/>
+          <a:p>
+            <a:endParaRPr lang="it-IT"/>
+          </a:p>
+        </p:txBody>
+      </p:sp>
+    </p:spTree>
+    <p:extLst>
+      <p:ext uri="{BB962C8B-B14F-4D97-AF65-F5344CB8AC3E}">
+        <p14:creationId xmlns:p14="http://schemas.microsoft.com/office/powerpoint/2010/main" val="289238580"/>
+      </p:ext>
+    </p:extLst>
+  </p:cSld>
+  <p:clrMapOvr>
+    <a:masterClrMapping/>
+  </p:clrMapOvr>
+</p:sld>
+</file>
+
+<file path=ppt/slides/slide6.xml><?xml version="1.0" encoding="utf-8"?>
+<p:sld xmlns:a="http://schemas.openxmlformats.org/drawingml/2006/main" xmlns:r="http://schemas.openxmlformats.org/officeDocument/2006/relationships" xmlns:p="http://schemas.openxmlformats.org/presentationml/2006/main">
+  <p:cSld>
+    <p:spTree>
+      <p:nvGrpSpPr>
+        <p:cNvPr id="1" name=""/>
+        <p:cNvGrpSpPr/>
+        <p:nvPr/>
+      </p:nvGrpSpPr>
+      <p:grpSpPr>
+        <a:xfrm>
+          <a:off x="0" y="0"/>
+          <a:ext cx="0" cy="0"/>
+          <a:chOff x="0" y="0"/>
+          <a:chExt cx="0" cy="0"/>
+        </a:xfrm>
+      </p:grpSpPr>
+      <p:sp>
+        <p:nvSpPr>
+          <p:cNvPr id="2" name="Titolo 1"/>
+          <p:cNvSpPr>
+            <a:spLocks noGrp="1"/>
+          </p:cNvSpPr>
+          <p:nvPr>
+            <p:ph type="title"/>
+          </p:nvPr>
+        </p:nvSpPr>
+        <p:spPr/>
+        <p:txBody>
+          <a:bodyPr/>
+          <a:lstStyle/>
+          <a:p>
+            <a:r>
+              <a:rPr lang="it-IT" dirty="0" smtClean="0"/>
+              <a:t>Varie ed eventuali</a:t>
+            </a:r>
+            <a:endParaRPr lang="it-IT" dirty="0"/>
+          </a:p>
+        </p:txBody>
+      </p:sp>
+      <p:sp>
+        <p:nvSpPr>
+          <p:cNvPr id="3" name="Segnaposto contenuto 2"/>
+          <p:cNvSpPr>
+            <a:spLocks noGrp="1"/>
+          </p:cNvSpPr>
+          <p:nvPr>
+            <p:ph idx="1"/>
+          </p:nvPr>
+        </p:nvSpPr>
+        <p:spPr/>
+        <p:txBody>
+          <a:bodyPr/>
+          <a:lstStyle/>
+          <a:p>
+            <a:endParaRPr lang="it-IT"/>
+          </a:p>
+        </p:txBody>
+      </p:sp>
+    </p:spTree>
+    <p:extLst>
+      <p:ext uri="{BB962C8B-B14F-4D97-AF65-F5344CB8AC3E}">
+        <p14:creationId xmlns:p14="http://schemas.microsoft.com/office/powerpoint/2010/main" val="2280028444"/>
       </p:ext>
     </p:extLst>
   </p:cSld>

</xml_diff>

<commit_message>
-Scheletro presentazione -Aggiornamento to-do
</commit_message>
<xml_diff>
--- a/Presentazione.pptx
+++ b/Presentazione.pptx
@@ -6,11 +6,17 @@
   </p:sldMasterIdLst>
   <p:sldIdLst>
     <p:sldId id="256" r:id="rId2"/>
-    <p:sldId id="257" r:id="rId3"/>
-    <p:sldId id="258" r:id="rId4"/>
-    <p:sldId id="259" r:id="rId5"/>
-    <p:sldId id="260" r:id="rId6"/>
-    <p:sldId id="261" r:id="rId7"/>
+    <p:sldId id="268" r:id="rId3"/>
+    <p:sldId id="269" r:id="rId4"/>
+    <p:sldId id="262" r:id="rId5"/>
+    <p:sldId id="257" r:id="rId6"/>
+    <p:sldId id="258" r:id="rId7"/>
+    <p:sldId id="259" r:id="rId8"/>
+    <p:sldId id="261" r:id="rId9"/>
+    <p:sldId id="264" r:id="rId10"/>
+    <p:sldId id="265" r:id="rId11"/>
+    <p:sldId id="266" r:id="rId12"/>
+    <p:sldId id="267" r:id="rId13"/>
   </p:sldIdLst>
   <p:sldSz cx="9144000" cy="6858000" type="screen4x3"/>
   <p:notesSz cx="6858000" cy="9144000"/>
@@ -3179,6 +3185,202 @@
 </p:sld>
 </file>
 
+<file path=ppt/slides/slide10.xml><?xml version="1.0" encoding="utf-8"?>
+<p:sld xmlns:a="http://schemas.openxmlformats.org/drawingml/2006/main" xmlns:r="http://schemas.openxmlformats.org/officeDocument/2006/relationships" xmlns:p="http://schemas.openxmlformats.org/presentationml/2006/main">
+  <p:cSld>
+    <p:spTree>
+      <p:nvGrpSpPr>
+        <p:cNvPr id="1" name=""/>
+        <p:cNvGrpSpPr/>
+        <p:nvPr/>
+      </p:nvGrpSpPr>
+      <p:grpSpPr>
+        <a:xfrm>
+          <a:off x="0" y="0"/>
+          <a:ext cx="0" cy="0"/>
+          <a:chOff x="0" y="0"/>
+          <a:chExt cx="0" cy="0"/>
+        </a:xfrm>
+      </p:grpSpPr>
+      <p:sp>
+        <p:nvSpPr>
+          <p:cNvPr id="2" name="Titolo 1"/>
+          <p:cNvSpPr>
+            <a:spLocks noGrp="1"/>
+          </p:cNvSpPr>
+          <p:nvPr>
+            <p:ph type="title"/>
+          </p:nvPr>
+        </p:nvSpPr>
+        <p:spPr>
+          <a:xfrm>
+            <a:off x="532537" y="2965105"/>
+            <a:ext cx="8229600" cy="1143000"/>
+          </a:xfrm>
+        </p:spPr>
+        <p:txBody>
+          <a:bodyPr/>
+          <a:lstStyle/>
+          <a:p>
+            <a:r>
+              <a:rPr lang="it-IT" dirty="0" smtClean="0"/>
+              <a:t>Come abbiamo lavorato?</a:t>
+            </a:r>
+            <a:endParaRPr lang="it-IT" dirty="0"/>
+          </a:p>
+        </p:txBody>
+      </p:sp>
+    </p:spTree>
+    <p:extLst>
+      <p:ext uri="{BB962C8B-B14F-4D97-AF65-F5344CB8AC3E}">
+        <p14:creationId xmlns:p14="http://schemas.microsoft.com/office/powerpoint/2010/main" val="3264805647"/>
+      </p:ext>
+    </p:extLst>
+  </p:cSld>
+  <p:clrMapOvr>
+    <a:masterClrMapping/>
+  </p:clrMapOvr>
+</p:sld>
+</file>
+
+<file path=ppt/slides/slide11.xml><?xml version="1.0" encoding="utf-8"?>
+<p:sld xmlns:a="http://schemas.openxmlformats.org/drawingml/2006/main" xmlns:r="http://schemas.openxmlformats.org/officeDocument/2006/relationships" xmlns:p="http://schemas.openxmlformats.org/presentationml/2006/main">
+  <p:cSld>
+    <p:spTree>
+      <p:nvGrpSpPr>
+        <p:cNvPr id="1" name=""/>
+        <p:cNvGrpSpPr/>
+        <p:nvPr/>
+      </p:nvGrpSpPr>
+      <p:grpSpPr>
+        <a:xfrm>
+          <a:off x="0" y="0"/>
+          <a:ext cx="0" cy="0"/>
+          <a:chOff x="0" y="0"/>
+          <a:chExt cx="0" cy="0"/>
+        </a:xfrm>
+      </p:grpSpPr>
+      <p:sp>
+        <p:nvSpPr>
+          <p:cNvPr id="2" name="Titolo 1"/>
+          <p:cNvSpPr>
+            <a:spLocks noGrp="1"/>
+          </p:cNvSpPr>
+          <p:nvPr>
+            <p:ph type="title"/>
+          </p:nvPr>
+        </p:nvSpPr>
+        <p:spPr/>
+        <p:txBody>
+          <a:bodyPr/>
+          <a:lstStyle/>
+          <a:p>
+            <a:r>
+              <a:rPr lang="it-IT" dirty="0" err="1" smtClean="0"/>
+              <a:t>Github</a:t>
+            </a:r>
+            <a:r>
+              <a:rPr lang="it-IT" dirty="0" smtClean="0"/>
+              <a:t> </a:t>
+            </a:r>
+            <a:r>
+              <a:rPr lang="it-IT" dirty="0" err="1" smtClean="0"/>
+              <a:t>mlml</a:t>
+            </a:r>
+            <a:endParaRPr lang="it-IT" dirty="0"/>
+          </a:p>
+        </p:txBody>
+      </p:sp>
+      <p:sp>
+        <p:nvSpPr>
+          <p:cNvPr id="3" name="Segnaposto contenuto 2"/>
+          <p:cNvSpPr>
+            <a:spLocks noGrp="1"/>
+          </p:cNvSpPr>
+          <p:nvPr>
+            <p:ph idx="1"/>
+          </p:nvPr>
+        </p:nvSpPr>
+        <p:spPr/>
+        <p:txBody>
+          <a:bodyPr/>
+          <a:lstStyle/>
+          <a:p>
+            <a:endParaRPr lang="it-IT"/>
+          </a:p>
+        </p:txBody>
+      </p:sp>
+    </p:spTree>
+    <p:extLst>
+      <p:ext uri="{BB962C8B-B14F-4D97-AF65-F5344CB8AC3E}">
+        <p14:creationId xmlns:p14="http://schemas.microsoft.com/office/powerpoint/2010/main" val="2731281060"/>
+      </p:ext>
+    </p:extLst>
+  </p:cSld>
+  <p:clrMapOvr>
+    <a:masterClrMapping/>
+  </p:clrMapOvr>
+</p:sld>
+</file>
+
+<file path=ppt/slides/slide12.xml><?xml version="1.0" encoding="utf-8"?>
+<p:sld xmlns:a="http://schemas.openxmlformats.org/drawingml/2006/main" xmlns:r="http://schemas.openxmlformats.org/officeDocument/2006/relationships" xmlns:p="http://schemas.openxmlformats.org/presentationml/2006/main">
+  <p:cSld>
+    <p:spTree>
+      <p:nvGrpSpPr>
+        <p:cNvPr id="1" name=""/>
+        <p:cNvGrpSpPr/>
+        <p:nvPr/>
+      </p:nvGrpSpPr>
+      <p:grpSpPr>
+        <a:xfrm>
+          <a:off x="0" y="0"/>
+          <a:ext cx="0" cy="0"/>
+          <a:chOff x="0" y="0"/>
+          <a:chExt cx="0" cy="0"/>
+        </a:xfrm>
+      </p:grpSpPr>
+      <p:sp>
+        <p:nvSpPr>
+          <p:cNvPr id="2" name="Titolo 1"/>
+          <p:cNvSpPr>
+            <a:spLocks noGrp="1"/>
+          </p:cNvSpPr>
+          <p:nvPr>
+            <p:ph type="title"/>
+          </p:nvPr>
+        </p:nvSpPr>
+        <p:spPr>
+          <a:xfrm>
+            <a:off x="457200" y="2744697"/>
+            <a:ext cx="8229600" cy="1143000"/>
+          </a:xfrm>
+        </p:spPr>
+        <p:txBody>
+          <a:bodyPr/>
+          <a:lstStyle/>
+          <a:p>
+            <a:r>
+              <a:rPr lang="it-IT" dirty="0" smtClean="0"/>
+              <a:t>FINE</a:t>
+            </a:r>
+            <a:endParaRPr lang="it-IT" dirty="0"/>
+          </a:p>
+        </p:txBody>
+      </p:sp>
+    </p:spTree>
+    <p:extLst>
+      <p:ext uri="{BB962C8B-B14F-4D97-AF65-F5344CB8AC3E}">
+        <p14:creationId xmlns:p14="http://schemas.microsoft.com/office/powerpoint/2010/main" val="358063728"/>
+      </p:ext>
+    </p:extLst>
+  </p:cSld>
+  <p:clrMapOvr>
+    <a:masterClrMapping/>
+  </p:clrMapOvr>
+</p:sld>
+</file>
+
 <file path=ppt/slides/slide2.xml><?xml version="1.0" encoding="utf-8"?>
 <p:sld xmlns:a="http://schemas.openxmlformats.org/drawingml/2006/main" xmlns:r="http://schemas.openxmlformats.org/officeDocument/2006/relationships" xmlns:p="http://schemas.openxmlformats.org/presentationml/2006/main">
   <p:cSld>
@@ -3206,42 +3408,32 @@
             <p:ph type="title"/>
           </p:nvPr>
         </p:nvSpPr>
-        <p:spPr/>
+        <p:spPr>
+          <a:xfrm>
+            <a:off x="457200" y="2868248"/>
+            <a:ext cx="8229600" cy="1143000"/>
+          </a:xfrm>
+        </p:spPr>
         <p:txBody>
           <a:bodyPr/>
           <a:lstStyle/>
           <a:p>
             <a:r>
               <a:rPr lang="it-IT" dirty="0" smtClean="0"/>
-              <a:t>Ragionamento inserimento tabella</a:t>
+              <a:t>Cenni stile e </a:t>
+            </a:r>
+            <a:r>
+              <a:rPr lang="it-IT" dirty="0" smtClean="0"/>
+              <a:t>html</a:t>
             </a:r>
             <a:endParaRPr lang="it-IT" dirty="0"/>
-          </a:p>
-        </p:txBody>
-      </p:sp>
-      <p:sp>
-        <p:nvSpPr>
-          <p:cNvPr id="3" name="Segnaposto contenuto 2"/>
-          <p:cNvSpPr>
-            <a:spLocks noGrp="1"/>
-          </p:cNvSpPr>
-          <p:nvPr>
-            <p:ph idx="1"/>
-          </p:nvPr>
-        </p:nvSpPr>
-        <p:spPr/>
-        <p:txBody>
-          <a:bodyPr/>
-          <a:lstStyle/>
-          <a:p>
-            <a:endParaRPr lang="it-IT"/>
           </a:p>
         </p:txBody>
       </p:sp>
     </p:spTree>
     <p:extLst>
       <p:ext uri="{BB962C8B-B14F-4D97-AF65-F5344CB8AC3E}">
-        <p14:creationId xmlns:p14="http://schemas.microsoft.com/office/powerpoint/2010/main" val="3613284139"/>
+        <p14:creationId xmlns:p14="http://schemas.microsoft.com/office/powerpoint/2010/main" val="3929833367"/>
       </p:ext>
     </p:extLst>
   </p:cSld>
@@ -3283,11 +3475,7 @@
           <a:bodyPr/>
           <a:lstStyle/>
           <a:p>
-            <a:r>
-              <a:rPr lang="it-IT" dirty="0" smtClean="0"/>
-              <a:t>Ragionamento mescolamento</a:t>
-            </a:r>
-            <a:endParaRPr lang="it-IT" dirty="0"/>
+            <a:endParaRPr lang="it-IT"/>
           </a:p>
         </p:txBody>
       </p:sp>
@@ -3313,7 +3501,7 @@
     </p:spTree>
     <p:extLst>
       <p:ext uri="{BB962C8B-B14F-4D97-AF65-F5344CB8AC3E}">
-        <p14:creationId xmlns:p14="http://schemas.microsoft.com/office/powerpoint/2010/main" val="3018076514"/>
+        <p14:creationId xmlns:p14="http://schemas.microsoft.com/office/powerpoint/2010/main" val="2435587752"/>
       </p:ext>
     </p:extLst>
   </p:cSld>
@@ -3350,42 +3538,32 @@
             <p:ph type="title"/>
           </p:nvPr>
         </p:nvSpPr>
-        <p:spPr/>
+        <p:spPr>
+          <a:xfrm>
+            <a:off x="457200" y="2932820"/>
+            <a:ext cx="8229600" cy="1143000"/>
+          </a:xfrm>
+        </p:spPr>
         <p:txBody>
           <a:bodyPr/>
           <a:lstStyle/>
           <a:p>
             <a:r>
               <a:rPr lang="it-IT" dirty="0" smtClean="0"/>
-              <a:t>Ragionamento click su cella</a:t>
+              <a:t>Ragionamenti </a:t>
+            </a:r>
+            <a:r>
+              <a:rPr lang="it-IT" dirty="0" err="1" smtClean="0"/>
+              <a:t>jQuery</a:t>
             </a:r>
             <a:endParaRPr lang="it-IT" dirty="0"/>
-          </a:p>
-        </p:txBody>
-      </p:sp>
-      <p:sp>
-        <p:nvSpPr>
-          <p:cNvPr id="3" name="Segnaposto contenuto 2"/>
-          <p:cNvSpPr>
-            <a:spLocks noGrp="1"/>
-          </p:cNvSpPr>
-          <p:nvPr>
-            <p:ph idx="1"/>
-          </p:nvPr>
-        </p:nvSpPr>
-        <p:spPr/>
-        <p:txBody>
-          <a:bodyPr/>
-          <a:lstStyle/>
-          <a:p>
-            <a:endParaRPr lang="it-IT"/>
           </a:p>
         </p:txBody>
       </p:sp>
     </p:spTree>
     <p:extLst>
       <p:ext uri="{BB962C8B-B14F-4D97-AF65-F5344CB8AC3E}">
-        <p14:creationId xmlns:p14="http://schemas.microsoft.com/office/powerpoint/2010/main" val="506087268"/>
+        <p14:creationId xmlns:p14="http://schemas.microsoft.com/office/powerpoint/2010/main" val="504778038"/>
       </p:ext>
     </p:extLst>
   </p:cSld>
@@ -3422,46 +3600,28 @@
             <p:ph type="title"/>
           </p:nvPr>
         </p:nvSpPr>
-        <p:spPr/>
+        <p:spPr>
+          <a:xfrm>
+            <a:off x="457200" y="467231"/>
+            <a:ext cx="8229600" cy="1143000"/>
+          </a:xfrm>
+        </p:spPr>
         <p:txBody>
           <a:bodyPr/>
           <a:lstStyle/>
           <a:p>
             <a:r>
               <a:rPr lang="it-IT" dirty="0" smtClean="0"/>
-              <a:t>Cenni stile e </a:t>
-            </a:r>
-            <a:r>
-              <a:rPr lang="it-IT" dirty="0" err="1" smtClean="0"/>
-              <a:t>index</a:t>
+              <a:t>Ragionamento inserimento tabella</a:t>
             </a:r>
             <a:endParaRPr lang="it-IT" dirty="0"/>
-          </a:p>
-        </p:txBody>
-      </p:sp>
-      <p:sp>
-        <p:nvSpPr>
-          <p:cNvPr id="3" name="Segnaposto contenuto 2"/>
-          <p:cNvSpPr>
-            <a:spLocks noGrp="1"/>
-          </p:cNvSpPr>
-          <p:nvPr>
-            <p:ph idx="1"/>
-          </p:nvPr>
-        </p:nvSpPr>
-        <p:spPr/>
-        <p:txBody>
-          <a:bodyPr/>
-          <a:lstStyle/>
-          <a:p>
-            <a:endParaRPr lang="it-IT"/>
           </a:p>
         </p:txBody>
       </p:sp>
     </p:spTree>
     <p:extLst>
       <p:ext uri="{BB962C8B-B14F-4D97-AF65-F5344CB8AC3E}">
-        <p14:creationId xmlns:p14="http://schemas.microsoft.com/office/powerpoint/2010/main" val="289238580"/>
+        <p14:creationId xmlns:p14="http://schemas.microsoft.com/office/powerpoint/2010/main" val="3613284139"/>
       </p:ext>
     </p:extLst>
   </p:cSld>
@@ -3505,28 +3665,158 @@
           <a:p>
             <a:r>
               <a:rPr lang="it-IT" dirty="0" smtClean="0"/>
+              <a:t>Ragionamento mescolamento</a:t>
+            </a:r>
+            <a:endParaRPr lang="it-IT" dirty="0"/>
+          </a:p>
+        </p:txBody>
+      </p:sp>
+      <p:sp>
+        <p:nvSpPr>
+          <p:cNvPr id="3" name="Segnaposto contenuto 2"/>
+          <p:cNvSpPr>
+            <a:spLocks noGrp="1"/>
+          </p:cNvSpPr>
+          <p:nvPr>
+            <p:ph idx="1"/>
+          </p:nvPr>
+        </p:nvSpPr>
+        <p:spPr/>
+        <p:txBody>
+          <a:bodyPr/>
+          <a:lstStyle/>
+          <a:p>
+            <a:endParaRPr lang="it-IT"/>
+          </a:p>
+        </p:txBody>
+      </p:sp>
+    </p:spTree>
+    <p:extLst>
+      <p:ext uri="{BB962C8B-B14F-4D97-AF65-F5344CB8AC3E}">
+        <p14:creationId xmlns:p14="http://schemas.microsoft.com/office/powerpoint/2010/main" val="3018076514"/>
+      </p:ext>
+    </p:extLst>
+  </p:cSld>
+  <p:clrMapOvr>
+    <a:masterClrMapping/>
+  </p:clrMapOvr>
+</p:sld>
+</file>
+
+<file path=ppt/slides/slide7.xml><?xml version="1.0" encoding="utf-8"?>
+<p:sld xmlns:a="http://schemas.openxmlformats.org/drawingml/2006/main" xmlns:r="http://schemas.openxmlformats.org/officeDocument/2006/relationships" xmlns:p="http://schemas.openxmlformats.org/presentationml/2006/main">
+  <p:cSld>
+    <p:spTree>
+      <p:nvGrpSpPr>
+        <p:cNvPr id="1" name=""/>
+        <p:cNvGrpSpPr/>
+        <p:nvPr/>
+      </p:nvGrpSpPr>
+      <p:grpSpPr>
+        <a:xfrm>
+          <a:off x="0" y="0"/>
+          <a:ext cx="0" cy="0"/>
+          <a:chOff x="0" y="0"/>
+          <a:chExt cx="0" cy="0"/>
+        </a:xfrm>
+      </p:grpSpPr>
+      <p:sp>
+        <p:nvSpPr>
+          <p:cNvPr id="2" name="Titolo 1"/>
+          <p:cNvSpPr>
+            <a:spLocks noGrp="1"/>
+          </p:cNvSpPr>
+          <p:nvPr>
+            <p:ph type="title"/>
+          </p:nvPr>
+        </p:nvSpPr>
+        <p:spPr/>
+        <p:txBody>
+          <a:bodyPr/>
+          <a:lstStyle/>
+          <a:p>
+            <a:r>
+              <a:rPr lang="it-IT" dirty="0" smtClean="0"/>
+              <a:t>Ragionamento click su cella</a:t>
+            </a:r>
+            <a:endParaRPr lang="it-IT" dirty="0"/>
+          </a:p>
+        </p:txBody>
+      </p:sp>
+      <p:sp>
+        <p:nvSpPr>
+          <p:cNvPr id="3" name="Segnaposto contenuto 2"/>
+          <p:cNvSpPr>
+            <a:spLocks noGrp="1"/>
+          </p:cNvSpPr>
+          <p:nvPr>
+            <p:ph idx="1"/>
+          </p:nvPr>
+        </p:nvSpPr>
+        <p:spPr/>
+        <p:txBody>
+          <a:bodyPr/>
+          <a:lstStyle/>
+          <a:p>
+            <a:endParaRPr lang="it-IT"/>
+          </a:p>
+        </p:txBody>
+      </p:sp>
+    </p:spTree>
+    <p:extLst>
+      <p:ext uri="{BB962C8B-B14F-4D97-AF65-F5344CB8AC3E}">
+        <p14:creationId xmlns:p14="http://schemas.microsoft.com/office/powerpoint/2010/main" val="506087268"/>
+      </p:ext>
+    </p:extLst>
+  </p:cSld>
+  <p:clrMapOvr>
+    <a:masterClrMapping/>
+  </p:clrMapOvr>
+</p:sld>
+</file>
+
+<file path=ppt/slides/slide8.xml><?xml version="1.0" encoding="utf-8"?>
+<p:sld xmlns:a="http://schemas.openxmlformats.org/drawingml/2006/main" xmlns:r="http://schemas.openxmlformats.org/officeDocument/2006/relationships" xmlns:p="http://schemas.openxmlformats.org/presentationml/2006/main">
+  <p:cSld>
+    <p:spTree>
+      <p:nvGrpSpPr>
+        <p:cNvPr id="1" name=""/>
+        <p:cNvGrpSpPr/>
+        <p:nvPr/>
+      </p:nvGrpSpPr>
+      <p:grpSpPr>
+        <a:xfrm>
+          <a:off x="0" y="0"/>
+          <a:ext cx="0" cy="0"/>
+          <a:chOff x="0" y="0"/>
+          <a:chExt cx="0" cy="0"/>
+        </a:xfrm>
+      </p:grpSpPr>
+      <p:sp>
+        <p:nvSpPr>
+          <p:cNvPr id="2" name="Titolo 1"/>
+          <p:cNvSpPr>
+            <a:spLocks noGrp="1"/>
+          </p:cNvSpPr>
+          <p:nvPr>
+            <p:ph type="title"/>
+          </p:nvPr>
+        </p:nvSpPr>
+        <p:spPr>
+          <a:xfrm>
+            <a:off x="457200" y="2782153"/>
+            <a:ext cx="8229600" cy="1143000"/>
+          </a:xfrm>
+        </p:spPr>
+        <p:txBody>
+          <a:bodyPr/>
+          <a:lstStyle/>
+          <a:p>
+            <a:r>
+              <a:rPr lang="it-IT" dirty="0" smtClean="0"/>
               <a:t>Varie ed eventuali</a:t>
             </a:r>
             <a:endParaRPr lang="it-IT" dirty="0"/>
-          </a:p>
-        </p:txBody>
-      </p:sp>
-      <p:sp>
-        <p:nvSpPr>
-          <p:cNvPr id="3" name="Segnaposto contenuto 2"/>
-          <p:cNvSpPr>
-            <a:spLocks noGrp="1"/>
-          </p:cNvSpPr>
-          <p:nvPr>
-            <p:ph idx="1"/>
-          </p:nvPr>
-        </p:nvSpPr>
-        <p:spPr/>
-        <p:txBody>
-          <a:bodyPr/>
-          <a:lstStyle/>
-          <a:p>
-            <a:endParaRPr lang="it-IT"/>
           </a:p>
         </p:txBody>
       </p:sp>
@@ -3534,6 +3824,74 @@
     <p:extLst>
       <p:ext uri="{BB962C8B-B14F-4D97-AF65-F5344CB8AC3E}">
         <p14:creationId xmlns:p14="http://schemas.microsoft.com/office/powerpoint/2010/main" val="2280028444"/>
+      </p:ext>
+    </p:extLst>
+  </p:cSld>
+  <p:clrMapOvr>
+    <a:masterClrMapping/>
+  </p:clrMapOvr>
+</p:sld>
+</file>
+
+<file path=ppt/slides/slide9.xml><?xml version="1.0" encoding="utf-8"?>
+<p:sld xmlns:a="http://schemas.openxmlformats.org/drawingml/2006/main" xmlns:r="http://schemas.openxmlformats.org/officeDocument/2006/relationships" xmlns:p="http://schemas.openxmlformats.org/presentationml/2006/main">
+  <p:cSld>
+    <p:spTree>
+      <p:nvGrpSpPr>
+        <p:cNvPr id="1" name=""/>
+        <p:cNvGrpSpPr/>
+        <p:nvPr/>
+      </p:nvGrpSpPr>
+      <p:grpSpPr>
+        <a:xfrm>
+          <a:off x="0" y="0"/>
+          <a:ext cx="0" cy="0"/>
+          <a:chOff x="0" y="0"/>
+          <a:chExt cx="0" cy="0"/>
+        </a:xfrm>
+      </p:grpSpPr>
+      <p:sp>
+        <p:nvSpPr>
+          <p:cNvPr id="2" name="Titolo 1"/>
+          <p:cNvSpPr>
+            <a:spLocks noGrp="1"/>
+          </p:cNvSpPr>
+          <p:nvPr>
+            <p:ph type="title"/>
+          </p:nvPr>
+        </p:nvSpPr>
+        <p:spPr/>
+        <p:txBody>
+          <a:bodyPr/>
+          <a:lstStyle/>
+          <a:p>
+            <a:endParaRPr lang="it-IT"/>
+          </a:p>
+        </p:txBody>
+      </p:sp>
+      <p:sp>
+        <p:nvSpPr>
+          <p:cNvPr id="3" name="Segnaposto contenuto 2"/>
+          <p:cNvSpPr>
+            <a:spLocks noGrp="1"/>
+          </p:cNvSpPr>
+          <p:nvPr>
+            <p:ph idx="1"/>
+          </p:nvPr>
+        </p:nvSpPr>
+        <p:spPr/>
+        <p:txBody>
+          <a:bodyPr/>
+          <a:lstStyle/>
+          <a:p>
+            <a:endParaRPr lang="it-IT"/>
+          </a:p>
+        </p:txBody>
+      </p:sp>
+    </p:spTree>
+    <p:extLst>
+      <p:ext uri="{BB962C8B-B14F-4D97-AF65-F5344CB8AC3E}">
+        <p14:creationId xmlns:p14="http://schemas.microsoft.com/office/powerpoint/2010/main" val="3862378440"/>
       </p:ext>
     </p:extLst>
   </p:cSld>

</xml_diff>